<commit_message>
Added Product Backlog and Deployment plan. Updated Class Diagram, Case Diagram, and State Diagram
</commit_message>
<xml_diff>
--- a/documentation/Case Diagram.pptx
+++ b/documentation/Case Diagram.pptx
@@ -306,7 +306,7 @@
               <a:spcBef>
                 <a:spcPts val="0"/>
               </a:spcBef>
-              <a:buSzPct val="100000"/>
+              <a:buSzPts val="1100"/>
               <a:buChar char="●"/>
               <a:defRPr sz="1100"/>
             </a:lvl1pPr>
@@ -314,7 +314,7 @@
               <a:spcBef>
                 <a:spcPts val="0"/>
               </a:spcBef>
-              <a:buSzPct val="100000"/>
+              <a:buSzPts val="1100"/>
               <a:buChar char="○"/>
               <a:defRPr sz="1100"/>
             </a:lvl2pPr>
@@ -322,7 +322,7 @@
               <a:spcBef>
                 <a:spcPts val="0"/>
               </a:spcBef>
-              <a:buSzPct val="100000"/>
+              <a:buSzPts val="1100"/>
               <a:buChar char="■"/>
               <a:defRPr sz="1100"/>
             </a:lvl3pPr>
@@ -330,7 +330,7 @@
               <a:spcBef>
                 <a:spcPts val="0"/>
               </a:spcBef>
-              <a:buSzPct val="100000"/>
+              <a:buSzPts val="1100"/>
               <a:buChar char="●"/>
               <a:defRPr sz="1100"/>
             </a:lvl4pPr>
@@ -338,7 +338,7 @@
               <a:spcBef>
                 <a:spcPts val="0"/>
               </a:spcBef>
-              <a:buSzPct val="100000"/>
+              <a:buSzPts val="1100"/>
               <a:buChar char="○"/>
               <a:defRPr sz="1100"/>
             </a:lvl5pPr>
@@ -346,7 +346,7 @@
               <a:spcBef>
                 <a:spcPts val="0"/>
               </a:spcBef>
-              <a:buSzPct val="100000"/>
+              <a:buSzPts val="1100"/>
               <a:buChar char="■"/>
               <a:defRPr sz="1100"/>
             </a:lvl6pPr>
@@ -354,7 +354,7 @@
               <a:spcBef>
                 <a:spcPts val="0"/>
               </a:spcBef>
-              <a:buSzPct val="100000"/>
+              <a:buSzPts val="1100"/>
               <a:buChar char="●"/>
               <a:defRPr sz="1100"/>
             </a:lvl7pPr>
@@ -362,7 +362,7 @@
               <a:spcBef>
                 <a:spcPts val="0"/>
               </a:spcBef>
-              <a:buSzPct val="100000"/>
+              <a:buSzPts val="1100"/>
               <a:buChar char="○"/>
               <a:defRPr sz="1100"/>
             </a:lvl8pPr>
@@ -370,7 +370,7 @@
               <a:spcBef>
                 <a:spcPts val="0"/>
               </a:spcBef>
-              <a:buSzPct val="100000"/>
+              <a:buSzPts val="1100"/>
               <a:buChar char="■"/>
               <a:defRPr sz="1100"/>
             </a:lvl9pPr>
@@ -458,7 +458,7 @@
           </a:bodyPr>
           <a:lstStyle/>
           <a:p>
-            <a:pPr lvl="0">
+            <a:pPr indent="0" lvl="0" marL="0">
               <a:spcBef>
                 <a:spcPts val="0"/>
               </a:spcBef>
@@ -520,63 +520,72 @@
               <a:spcBef>
                 <a:spcPts val="0"/>
               </a:spcBef>
-              <a:buSzPct val="100000"/>
+              <a:buSzPts val="5200"/>
+              <a:buNone/>
               <a:defRPr sz="5200"/>
             </a:lvl1pPr>
             <a:lvl2pPr lvl="1" algn="ctr">
               <a:spcBef>
                 <a:spcPts val="0"/>
               </a:spcBef>
-              <a:buSzPct val="100000"/>
+              <a:buSzPts val="5200"/>
+              <a:buNone/>
               <a:defRPr sz="5200"/>
             </a:lvl2pPr>
             <a:lvl3pPr lvl="2" algn="ctr">
               <a:spcBef>
                 <a:spcPts val="0"/>
               </a:spcBef>
-              <a:buSzPct val="100000"/>
+              <a:buSzPts val="5200"/>
+              <a:buNone/>
               <a:defRPr sz="5200"/>
             </a:lvl3pPr>
             <a:lvl4pPr lvl="3" algn="ctr">
               <a:spcBef>
                 <a:spcPts val="0"/>
               </a:spcBef>
-              <a:buSzPct val="100000"/>
+              <a:buSzPts val="5200"/>
+              <a:buNone/>
               <a:defRPr sz="5200"/>
             </a:lvl4pPr>
             <a:lvl5pPr lvl="4" algn="ctr">
               <a:spcBef>
                 <a:spcPts val="0"/>
               </a:spcBef>
-              <a:buSzPct val="100000"/>
+              <a:buSzPts val="5200"/>
+              <a:buNone/>
               <a:defRPr sz="5200"/>
             </a:lvl5pPr>
             <a:lvl6pPr lvl="5" algn="ctr">
               <a:spcBef>
                 <a:spcPts val="0"/>
               </a:spcBef>
-              <a:buSzPct val="100000"/>
+              <a:buSzPts val="5200"/>
+              <a:buNone/>
               <a:defRPr sz="5200"/>
             </a:lvl6pPr>
             <a:lvl7pPr lvl="6" algn="ctr">
               <a:spcBef>
                 <a:spcPts val="0"/>
               </a:spcBef>
-              <a:buSzPct val="100000"/>
+              <a:buSzPts val="5200"/>
+              <a:buNone/>
               <a:defRPr sz="5200"/>
             </a:lvl7pPr>
             <a:lvl8pPr lvl="7" algn="ctr">
               <a:spcBef>
                 <a:spcPts val="0"/>
               </a:spcBef>
-              <a:buSzPct val="100000"/>
+              <a:buSzPts val="5200"/>
+              <a:buNone/>
               <a:defRPr sz="5200"/>
             </a:lvl8pPr>
             <a:lvl9pPr lvl="8" algn="ctr">
               <a:spcBef>
                 <a:spcPts val="0"/>
               </a:spcBef>
-              <a:buSzPct val="100000"/>
+              <a:buSzPts val="5200"/>
+              <a:buNone/>
               <a:defRPr sz="5200"/>
             </a:lvl9pPr>
           </a:lstStyle>
@@ -613,7 +622,7 @@
               <a:spcAft>
                 <a:spcPts val="0"/>
               </a:spcAft>
-              <a:buSzPct val="100000"/>
+              <a:buSzPts val="2800"/>
               <a:buNone/>
               <a:defRPr sz="2800"/>
             </a:lvl1pPr>
@@ -627,7 +636,7 @@
               <a:spcAft>
                 <a:spcPts val="0"/>
               </a:spcAft>
-              <a:buSzPct val="100000"/>
+              <a:buSzPts val="2800"/>
               <a:buNone/>
               <a:defRPr sz="2800"/>
             </a:lvl2pPr>
@@ -641,7 +650,7 @@
               <a:spcAft>
                 <a:spcPts val="0"/>
               </a:spcAft>
-              <a:buSzPct val="100000"/>
+              <a:buSzPts val="2800"/>
               <a:buNone/>
               <a:defRPr sz="2800"/>
             </a:lvl3pPr>
@@ -655,7 +664,7 @@
               <a:spcAft>
                 <a:spcPts val="0"/>
               </a:spcAft>
-              <a:buSzPct val="100000"/>
+              <a:buSzPts val="2800"/>
               <a:buNone/>
               <a:defRPr sz="2800"/>
             </a:lvl4pPr>
@@ -669,7 +678,7 @@
               <a:spcAft>
                 <a:spcPts val="0"/>
               </a:spcAft>
-              <a:buSzPct val="100000"/>
+              <a:buSzPts val="2800"/>
               <a:buNone/>
               <a:defRPr sz="2800"/>
             </a:lvl5pPr>
@@ -683,7 +692,7 @@
               <a:spcAft>
                 <a:spcPts val="0"/>
               </a:spcAft>
-              <a:buSzPct val="100000"/>
+              <a:buSzPts val="2800"/>
               <a:buNone/>
               <a:defRPr sz="2800"/>
             </a:lvl6pPr>
@@ -697,7 +706,7 @@
               <a:spcAft>
                 <a:spcPts val="0"/>
               </a:spcAft>
-              <a:buSzPct val="100000"/>
+              <a:buSzPts val="2800"/>
               <a:buNone/>
               <a:defRPr sz="2800"/>
             </a:lvl7pPr>
@@ -711,7 +720,7 @@
               <a:spcAft>
                 <a:spcPts val="0"/>
               </a:spcAft>
-              <a:buSzPct val="100000"/>
+              <a:buSzPts val="2800"/>
               <a:buNone/>
               <a:defRPr sz="2800"/>
             </a:lvl8pPr>
@@ -725,7 +734,7 @@
               <a:spcAft>
                 <a:spcPts val="0"/>
               </a:spcAft>
-              <a:buSzPct val="100000"/>
+              <a:buSzPts val="2800"/>
               <a:buNone/>
               <a:defRPr sz="2800"/>
             </a:lvl9pPr>
@@ -756,7 +765,7 @@
           </a:bodyPr>
           <a:lstStyle/>
           <a:p>
-            <a:pPr lvl="0">
+            <a:pPr indent="0" lvl="0" marL="0">
               <a:spcBef>
                 <a:spcPts val="0"/>
               </a:spcBef>
@@ -818,63 +827,72 @@
               <a:spcBef>
                 <a:spcPts val="0"/>
               </a:spcBef>
-              <a:buSzPct val="100000"/>
+              <a:buSzPts val="12000"/>
+              <a:buNone/>
               <a:defRPr sz="12000"/>
             </a:lvl1pPr>
             <a:lvl2pPr lvl="1" algn="ctr">
               <a:spcBef>
                 <a:spcPts val="0"/>
               </a:spcBef>
-              <a:buSzPct val="100000"/>
+              <a:buSzPts val="12000"/>
+              <a:buNone/>
               <a:defRPr sz="12000"/>
             </a:lvl2pPr>
             <a:lvl3pPr lvl="2" algn="ctr">
               <a:spcBef>
                 <a:spcPts val="0"/>
               </a:spcBef>
-              <a:buSzPct val="100000"/>
+              <a:buSzPts val="12000"/>
+              <a:buNone/>
               <a:defRPr sz="12000"/>
             </a:lvl3pPr>
             <a:lvl4pPr lvl="3" algn="ctr">
               <a:spcBef>
                 <a:spcPts val="0"/>
               </a:spcBef>
-              <a:buSzPct val="100000"/>
+              <a:buSzPts val="12000"/>
+              <a:buNone/>
               <a:defRPr sz="12000"/>
             </a:lvl4pPr>
             <a:lvl5pPr lvl="4" algn="ctr">
               <a:spcBef>
                 <a:spcPts val="0"/>
               </a:spcBef>
-              <a:buSzPct val="100000"/>
+              <a:buSzPts val="12000"/>
+              <a:buNone/>
               <a:defRPr sz="12000"/>
             </a:lvl5pPr>
             <a:lvl6pPr lvl="5" algn="ctr">
               <a:spcBef>
                 <a:spcPts val="0"/>
               </a:spcBef>
-              <a:buSzPct val="100000"/>
+              <a:buSzPts val="12000"/>
+              <a:buNone/>
               <a:defRPr sz="12000"/>
             </a:lvl6pPr>
             <a:lvl7pPr lvl="6" algn="ctr">
               <a:spcBef>
                 <a:spcPts val="0"/>
               </a:spcBef>
-              <a:buSzPct val="100000"/>
+              <a:buSzPts val="12000"/>
+              <a:buNone/>
               <a:defRPr sz="12000"/>
             </a:lvl7pPr>
             <a:lvl8pPr lvl="7" algn="ctr">
               <a:spcBef>
                 <a:spcPts val="0"/>
               </a:spcBef>
-              <a:buSzPct val="100000"/>
+              <a:buSzPts val="12000"/>
+              <a:buNone/>
               <a:defRPr sz="12000"/>
             </a:lvl8pPr>
             <a:lvl9pPr lvl="8" algn="ctr">
               <a:spcBef>
                 <a:spcPts val="0"/>
               </a:spcBef>
-              <a:buSzPct val="100000"/>
+              <a:buSzPts val="12000"/>
+              <a:buNone/>
               <a:defRPr sz="12000"/>
             </a:lvl9pPr>
           </a:lstStyle>
@@ -905,54 +923,72 @@
               <a:spcBef>
                 <a:spcPts val="0"/>
               </a:spcBef>
+              <a:buSzPts val="1800"/>
+              <a:buChar char="●"/>
               <a:defRPr/>
             </a:lvl1pPr>
             <a:lvl2pPr lvl="1" algn="ctr">
               <a:spcBef>
                 <a:spcPts val="0"/>
               </a:spcBef>
+              <a:buSzPts val="1400"/>
+              <a:buChar char="○"/>
               <a:defRPr/>
             </a:lvl2pPr>
             <a:lvl3pPr lvl="2" algn="ctr">
               <a:spcBef>
                 <a:spcPts val="0"/>
               </a:spcBef>
+              <a:buSzPts val="1400"/>
+              <a:buChar char="■"/>
               <a:defRPr/>
             </a:lvl3pPr>
             <a:lvl4pPr lvl="3" algn="ctr">
               <a:spcBef>
                 <a:spcPts val="0"/>
               </a:spcBef>
+              <a:buSzPts val="1400"/>
+              <a:buChar char="●"/>
               <a:defRPr/>
             </a:lvl4pPr>
             <a:lvl5pPr lvl="4" algn="ctr">
               <a:spcBef>
                 <a:spcPts val="0"/>
               </a:spcBef>
+              <a:buSzPts val="1400"/>
+              <a:buChar char="○"/>
               <a:defRPr/>
             </a:lvl5pPr>
             <a:lvl6pPr lvl="5" algn="ctr">
               <a:spcBef>
                 <a:spcPts val="0"/>
               </a:spcBef>
+              <a:buSzPts val="1400"/>
+              <a:buChar char="■"/>
               <a:defRPr/>
             </a:lvl6pPr>
             <a:lvl7pPr lvl="6" algn="ctr">
               <a:spcBef>
                 <a:spcPts val="0"/>
               </a:spcBef>
+              <a:buSzPts val="1400"/>
+              <a:buChar char="●"/>
               <a:defRPr/>
             </a:lvl7pPr>
             <a:lvl8pPr lvl="7" algn="ctr">
               <a:spcBef>
                 <a:spcPts val="0"/>
               </a:spcBef>
+              <a:buSzPts val="1400"/>
+              <a:buChar char="○"/>
               <a:defRPr/>
             </a:lvl8pPr>
             <a:lvl9pPr lvl="8" algn="ctr">
               <a:spcBef>
                 <a:spcPts val="0"/>
               </a:spcBef>
+              <a:buSzPts val="1400"/>
+              <a:buChar char="■"/>
               <a:defRPr/>
             </a:lvl9pPr>
           </a:lstStyle>
@@ -982,7 +1018,7 @@
           </a:bodyPr>
           <a:lstStyle/>
           <a:p>
-            <a:pPr lvl="0">
+            <a:pPr indent="0" lvl="0" marL="0">
               <a:spcBef>
                 <a:spcPts val="0"/>
               </a:spcBef>
@@ -1043,7 +1079,7 @@
           </a:bodyPr>
           <a:lstStyle/>
           <a:p>
-            <a:pPr lvl="0">
+            <a:pPr indent="0" lvl="0" marL="0">
               <a:spcBef>
                 <a:spcPts val="0"/>
               </a:spcBef>
@@ -1105,63 +1141,72 @@
               <a:spcBef>
                 <a:spcPts val="0"/>
               </a:spcBef>
-              <a:buSzPct val="100000"/>
+              <a:buSzPts val="3600"/>
+              <a:buNone/>
               <a:defRPr sz="3600"/>
             </a:lvl1pPr>
             <a:lvl2pPr lvl="1" algn="ctr">
               <a:spcBef>
                 <a:spcPts val="0"/>
               </a:spcBef>
-              <a:buSzPct val="100000"/>
+              <a:buSzPts val="3600"/>
+              <a:buNone/>
               <a:defRPr sz="3600"/>
             </a:lvl2pPr>
             <a:lvl3pPr lvl="2" algn="ctr">
               <a:spcBef>
                 <a:spcPts val="0"/>
               </a:spcBef>
-              <a:buSzPct val="100000"/>
+              <a:buSzPts val="3600"/>
+              <a:buNone/>
               <a:defRPr sz="3600"/>
             </a:lvl3pPr>
             <a:lvl4pPr lvl="3" algn="ctr">
               <a:spcBef>
                 <a:spcPts val="0"/>
               </a:spcBef>
-              <a:buSzPct val="100000"/>
+              <a:buSzPts val="3600"/>
+              <a:buNone/>
               <a:defRPr sz="3600"/>
             </a:lvl4pPr>
             <a:lvl5pPr lvl="4" algn="ctr">
               <a:spcBef>
                 <a:spcPts val="0"/>
               </a:spcBef>
-              <a:buSzPct val="100000"/>
+              <a:buSzPts val="3600"/>
+              <a:buNone/>
               <a:defRPr sz="3600"/>
             </a:lvl5pPr>
             <a:lvl6pPr lvl="5" algn="ctr">
               <a:spcBef>
                 <a:spcPts val="0"/>
               </a:spcBef>
-              <a:buSzPct val="100000"/>
+              <a:buSzPts val="3600"/>
+              <a:buNone/>
               <a:defRPr sz="3600"/>
             </a:lvl6pPr>
             <a:lvl7pPr lvl="6" algn="ctr">
               <a:spcBef>
                 <a:spcPts val="0"/>
               </a:spcBef>
-              <a:buSzPct val="100000"/>
+              <a:buSzPts val="3600"/>
+              <a:buNone/>
               <a:defRPr sz="3600"/>
             </a:lvl7pPr>
             <a:lvl8pPr lvl="7" algn="ctr">
               <a:spcBef>
                 <a:spcPts val="0"/>
               </a:spcBef>
-              <a:buSzPct val="100000"/>
+              <a:buSzPts val="3600"/>
+              <a:buNone/>
               <a:defRPr sz="3600"/>
             </a:lvl8pPr>
             <a:lvl9pPr lvl="8" algn="ctr">
               <a:spcBef>
                 <a:spcPts val="0"/>
               </a:spcBef>
-              <a:buSzPct val="100000"/>
+              <a:buSzPts val="3600"/>
+              <a:buNone/>
               <a:defRPr sz="3600"/>
             </a:lvl9pPr>
           </a:lstStyle>
@@ -1191,7 +1236,7 @@
           </a:bodyPr>
           <a:lstStyle/>
           <a:p>
-            <a:pPr lvl="0">
+            <a:pPr indent="0" lvl="0" marL="0">
               <a:spcBef>
                 <a:spcPts val="0"/>
               </a:spcBef>
@@ -1253,54 +1298,72 @@
               <a:spcBef>
                 <a:spcPts val="0"/>
               </a:spcBef>
+              <a:buSzPts val="2800"/>
+              <a:buNone/>
               <a:defRPr/>
             </a:lvl1pPr>
             <a:lvl2pPr lvl="1">
               <a:spcBef>
                 <a:spcPts val="0"/>
               </a:spcBef>
+              <a:buSzPts val="2800"/>
+              <a:buNone/>
               <a:defRPr/>
             </a:lvl2pPr>
             <a:lvl3pPr lvl="2">
               <a:spcBef>
                 <a:spcPts val="0"/>
               </a:spcBef>
+              <a:buSzPts val="2800"/>
+              <a:buNone/>
               <a:defRPr/>
             </a:lvl3pPr>
             <a:lvl4pPr lvl="3">
               <a:spcBef>
                 <a:spcPts val="0"/>
               </a:spcBef>
+              <a:buSzPts val="2800"/>
+              <a:buNone/>
               <a:defRPr/>
             </a:lvl4pPr>
             <a:lvl5pPr lvl="4">
               <a:spcBef>
                 <a:spcPts val="0"/>
               </a:spcBef>
+              <a:buSzPts val="2800"/>
+              <a:buNone/>
               <a:defRPr/>
             </a:lvl5pPr>
             <a:lvl6pPr lvl="5">
               <a:spcBef>
                 <a:spcPts val="0"/>
               </a:spcBef>
+              <a:buSzPts val="2800"/>
+              <a:buNone/>
               <a:defRPr/>
             </a:lvl6pPr>
             <a:lvl7pPr lvl="6">
               <a:spcBef>
                 <a:spcPts val="0"/>
               </a:spcBef>
+              <a:buSzPts val="2800"/>
+              <a:buNone/>
               <a:defRPr/>
             </a:lvl7pPr>
             <a:lvl8pPr lvl="7">
               <a:spcBef>
                 <a:spcPts val="0"/>
               </a:spcBef>
+              <a:buSzPts val="2800"/>
+              <a:buNone/>
               <a:defRPr/>
             </a:lvl8pPr>
             <a:lvl9pPr lvl="8">
               <a:spcBef>
                 <a:spcPts val="0"/>
               </a:spcBef>
+              <a:buSzPts val="2800"/>
+              <a:buNone/>
               <a:defRPr/>
             </a:lvl9pPr>
           </a:lstStyle>
@@ -1331,54 +1394,72 @@
               <a:spcBef>
                 <a:spcPts val="0"/>
               </a:spcBef>
+              <a:buSzPts val="1800"/>
+              <a:buChar char="●"/>
               <a:defRPr/>
             </a:lvl1pPr>
             <a:lvl2pPr lvl="1">
               <a:spcBef>
                 <a:spcPts val="0"/>
               </a:spcBef>
+              <a:buSzPts val="1400"/>
+              <a:buChar char="○"/>
               <a:defRPr/>
             </a:lvl2pPr>
             <a:lvl3pPr lvl="2">
               <a:spcBef>
                 <a:spcPts val="0"/>
               </a:spcBef>
+              <a:buSzPts val="1400"/>
+              <a:buChar char="■"/>
               <a:defRPr/>
             </a:lvl3pPr>
             <a:lvl4pPr lvl="3">
               <a:spcBef>
                 <a:spcPts val="0"/>
               </a:spcBef>
+              <a:buSzPts val="1400"/>
+              <a:buChar char="●"/>
               <a:defRPr/>
             </a:lvl4pPr>
             <a:lvl5pPr lvl="4">
               <a:spcBef>
                 <a:spcPts val="0"/>
               </a:spcBef>
+              <a:buSzPts val="1400"/>
+              <a:buChar char="○"/>
               <a:defRPr/>
             </a:lvl5pPr>
             <a:lvl6pPr lvl="5">
               <a:spcBef>
                 <a:spcPts val="0"/>
               </a:spcBef>
+              <a:buSzPts val="1400"/>
+              <a:buChar char="■"/>
               <a:defRPr/>
             </a:lvl6pPr>
             <a:lvl7pPr lvl="6">
               <a:spcBef>
                 <a:spcPts val="0"/>
               </a:spcBef>
+              <a:buSzPts val="1400"/>
+              <a:buChar char="●"/>
               <a:defRPr/>
             </a:lvl7pPr>
             <a:lvl8pPr lvl="7">
               <a:spcBef>
                 <a:spcPts val="0"/>
               </a:spcBef>
+              <a:buSzPts val="1400"/>
+              <a:buChar char="○"/>
               <a:defRPr/>
             </a:lvl8pPr>
             <a:lvl9pPr lvl="8">
               <a:spcBef>
                 <a:spcPts val="0"/>
               </a:spcBef>
+              <a:buSzPts val="1400"/>
+              <a:buChar char="■"/>
               <a:defRPr/>
             </a:lvl9pPr>
           </a:lstStyle>
@@ -1408,7 +1489,7 @@
           </a:bodyPr>
           <a:lstStyle/>
           <a:p>
-            <a:pPr lvl="0">
+            <a:pPr indent="0" lvl="0" marL="0">
               <a:spcBef>
                 <a:spcPts val="0"/>
               </a:spcBef>
@@ -1470,54 +1551,72 @@
               <a:spcBef>
                 <a:spcPts val="0"/>
               </a:spcBef>
+              <a:buSzPts val="2800"/>
+              <a:buNone/>
               <a:defRPr/>
             </a:lvl1pPr>
             <a:lvl2pPr lvl="1">
               <a:spcBef>
                 <a:spcPts val="0"/>
               </a:spcBef>
+              <a:buSzPts val="2800"/>
+              <a:buNone/>
               <a:defRPr/>
             </a:lvl2pPr>
             <a:lvl3pPr lvl="2">
               <a:spcBef>
                 <a:spcPts val="0"/>
               </a:spcBef>
+              <a:buSzPts val="2800"/>
+              <a:buNone/>
               <a:defRPr/>
             </a:lvl3pPr>
             <a:lvl4pPr lvl="3">
               <a:spcBef>
                 <a:spcPts val="0"/>
               </a:spcBef>
+              <a:buSzPts val="2800"/>
+              <a:buNone/>
               <a:defRPr/>
             </a:lvl4pPr>
             <a:lvl5pPr lvl="4">
               <a:spcBef>
                 <a:spcPts val="0"/>
               </a:spcBef>
+              <a:buSzPts val="2800"/>
+              <a:buNone/>
               <a:defRPr/>
             </a:lvl5pPr>
             <a:lvl6pPr lvl="5">
               <a:spcBef>
                 <a:spcPts val="0"/>
               </a:spcBef>
+              <a:buSzPts val="2800"/>
+              <a:buNone/>
               <a:defRPr/>
             </a:lvl6pPr>
             <a:lvl7pPr lvl="6">
               <a:spcBef>
                 <a:spcPts val="0"/>
               </a:spcBef>
+              <a:buSzPts val="2800"/>
+              <a:buNone/>
               <a:defRPr/>
             </a:lvl7pPr>
             <a:lvl8pPr lvl="7">
               <a:spcBef>
                 <a:spcPts val="0"/>
               </a:spcBef>
+              <a:buSzPts val="2800"/>
+              <a:buNone/>
               <a:defRPr/>
             </a:lvl8pPr>
             <a:lvl9pPr lvl="8">
               <a:spcBef>
                 <a:spcPts val="0"/>
               </a:spcBef>
+              <a:buSzPts val="2800"/>
+              <a:buNone/>
               <a:defRPr/>
             </a:lvl9pPr>
           </a:lstStyle>
@@ -1548,63 +1647,72 @@
               <a:spcBef>
                 <a:spcPts val="0"/>
               </a:spcBef>
-              <a:buSzPct val="100000"/>
+              <a:buSzPts val="1400"/>
+              <a:buChar char="●"/>
               <a:defRPr sz="1400"/>
             </a:lvl1pPr>
             <a:lvl2pPr lvl="1">
               <a:spcBef>
                 <a:spcPts val="0"/>
               </a:spcBef>
-              <a:buSzPct val="100000"/>
+              <a:buSzPts val="1200"/>
+              <a:buChar char="○"/>
               <a:defRPr sz="1200"/>
             </a:lvl2pPr>
             <a:lvl3pPr lvl="2">
               <a:spcBef>
                 <a:spcPts val="0"/>
               </a:spcBef>
-              <a:buSzPct val="100000"/>
+              <a:buSzPts val="1200"/>
+              <a:buChar char="■"/>
               <a:defRPr sz="1200"/>
             </a:lvl3pPr>
             <a:lvl4pPr lvl="3">
               <a:spcBef>
                 <a:spcPts val="0"/>
               </a:spcBef>
-              <a:buSzPct val="100000"/>
+              <a:buSzPts val="1200"/>
+              <a:buChar char="●"/>
               <a:defRPr sz="1200"/>
             </a:lvl4pPr>
             <a:lvl5pPr lvl="4">
               <a:spcBef>
                 <a:spcPts val="0"/>
               </a:spcBef>
-              <a:buSzPct val="100000"/>
+              <a:buSzPts val="1200"/>
+              <a:buChar char="○"/>
               <a:defRPr sz="1200"/>
             </a:lvl5pPr>
             <a:lvl6pPr lvl="5">
               <a:spcBef>
                 <a:spcPts val="0"/>
               </a:spcBef>
-              <a:buSzPct val="100000"/>
+              <a:buSzPts val="1200"/>
+              <a:buChar char="■"/>
               <a:defRPr sz="1200"/>
             </a:lvl6pPr>
             <a:lvl7pPr lvl="6">
               <a:spcBef>
                 <a:spcPts val="0"/>
               </a:spcBef>
-              <a:buSzPct val="100000"/>
+              <a:buSzPts val="1200"/>
+              <a:buChar char="●"/>
               <a:defRPr sz="1200"/>
             </a:lvl7pPr>
             <a:lvl8pPr lvl="7">
               <a:spcBef>
                 <a:spcPts val="0"/>
               </a:spcBef>
-              <a:buSzPct val="100000"/>
+              <a:buSzPts val="1200"/>
+              <a:buChar char="○"/>
               <a:defRPr sz="1200"/>
             </a:lvl8pPr>
             <a:lvl9pPr lvl="8">
               <a:spcBef>
                 <a:spcPts val="0"/>
               </a:spcBef>
-              <a:buSzPct val="100000"/>
+              <a:buSzPts val="1200"/>
+              <a:buChar char="■"/>
               <a:defRPr sz="1200"/>
             </a:lvl9pPr>
           </a:lstStyle>
@@ -1635,63 +1743,72 @@
               <a:spcBef>
                 <a:spcPts val="0"/>
               </a:spcBef>
-              <a:buSzPct val="100000"/>
+              <a:buSzPts val="1400"/>
+              <a:buChar char="●"/>
               <a:defRPr sz="1400"/>
             </a:lvl1pPr>
             <a:lvl2pPr lvl="1">
               <a:spcBef>
                 <a:spcPts val="0"/>
               </a:spcBef>
-              <a:buSzPct val="100000"/>
+              <a:buSzPts val="1200"/>
+              <a:buChar char="○"/>
               <a:defRPr sz="1200"/>
             </a:lvl2pPr>
             <a:lvl3pPr lvl="2">
               <a:spcBef>
                 <a:spcPts val="0"/>
               </a:spcBef>
-              <a:buSzPct val="100000"/>
+              <a:buSzPts val="1200"/>
+              <a:buChar char="■"/>
               <a:defRPr sz="1200"/>
             </a:lvl3pPr>
             <a:lvl4pPr lvl="3">
               <a:spcBef>
                 <a:spcPts val="0"/>
               </a:spcBef>
-              <a:buSzPct val="100000"/>
+              <a:buSzPts val="1200"/>
+              <a:buChar char="●"/>
               <a:defRPr sz="1200"/>
             </a:lvl4pPr>
             <a:lvl5pPr lvl="4">
               <a:spcBef>
                 <a:spcPts val="0"/>
               </a:spcBef>
-              <a:buSzPct val="100000"/>
+              <a:buSzPts val="1200"/>
+              <a:buChar char="○"/>
               <a:defRPr sz="1200"/>
             </a:lvl5pPr>
             <a:lvl6pPr lvl="5">
               <a:spcBef>
                 <a:spcPts val="0"/>
               </a:spcBef>
-              <a:buSzPct val="100000"/>
+              <a:buSzPts val="1200"/>
+              <a:buChar char="■"/>
               <a:defRPr sz="1200"/>
             </a:lvl6pPr>
             <a:lvl7pPr lvl="6">
               <a:spcBef>
                 <a:spcPts val="0"/>
               </a:spcBef>
-              <a:buSzPct val="100000"/>
+              <a:buSzPts val="1200"/>
+              <a:buChar char="●"/>
               <a:defRPr sz="1200"/>
             </a:lvl7pPr>
             <a:lvl8pPr lvl="7">
               <a:spcBef>
                 <a:spcPts val="0"/>
               </a:spcBef>
-              <a:buSzPct val="100000"/>
+              <a:buSzPts val="1200"/>
+              <a:buChar char="○"/>
               <a:defRPr sz="1200"/>
             </a:lvl8pPr>
             <a:lvl9pPr lvl="8">
               <a:spcBef>
                 <a:spcPts val="0"/>
               </a:spcBef>
-              <a:buSzPct val="100000"/>
+              <a:buSzPts val="1200"/>
+              <a:buChar char="■"/>
               <a:defRPr sz="1200"/>
             </a:lvl9pPr>
           </a:lstStyle>
@@ -1721,7 +1838,7 @@
           </a:bodyPr>
           <a:lstStyle/>
           <a:p>
-            <a:pPr lvl="0">
+            <a:pPr indent="0" lvl="0" marL="0">
               <a:spcBef>
                 <a:spcPts val="0"/>
               </a:spcBef>
@@ -1783,54 +1900,72 @@
               <a:spcBef>
                 <a:spcPts val="0"/>
               </a:spcBef>
+              <a:buSzPts val="2800"/>
+              <a:buNone/>
               <a:defRPr/>
             </a:lvl1pPr>
             <a:lvl2pPr lvl="1">
               <a:spcBef>
                 <a:spcPts val="0"/>
               </a:spcBef>
+              <a:buSzPts val="2800"/>
+              <a:buNone/>
               <a:defRPr/>
             </a:lvl2pPr>
             <a:lvl3pPr lvl="2">
               <a:spcBef>
                 <a:spcPts val="0"/>
               </a:spcBef>
+              <a:buSzPts val="2800"/>
+              <a:buNone/>
               <a:defRPr/>
             </a:lvl3pPr>
             <a:lvl4pPr lvl="3">
               <a:spcBef>
                 <a:spcPts val="0"/>
               </a:spcBef>
+              <a:buSzPts val="2800"/>
+              <a:buNone/>
               <a:defRPr/>
             </a:lvl4pPr>
             <a:lvl5pPr lvl="4">
               <a:spcBef>
                 <a:spcPts val="0"/>
               </a:spcBef>
+              <a:buSzPts val="2800"/>
+              <a:buNone/>
               <a:defRPr/>
             </a:lvl5pPr>
             <a:lvl6pPr lvl="5">
               <a:spcBef>
                 <a:spcPts val="0"/>
               </a:spcBef>
+              <a:buSzPts val="2800"/>
+              <a:buNone/>
               <a:defRPr/>
             </a:lvl6pPr>
             <a:lvl7pPr lvl="6">
               <a:spcBef>
                 <a:spcPts val="0"/>
               </a:spcBef>
+              <a:buSzPts val="2800"/>
+              <a:buNone/>
               <a:defRPr/>
             </a:lvl7pPr>
             <a:lvl8pPr lvl="7">
               <a:spcBef>
                 <a:spcPts val="0"/>
               </a:spcBef>
+              <a:buSzPts val="2800"/>
+              <a:buNone/>
               <a:defRPr/>
             </a:lvl8pPr>
             <a:lvl9pPr lvl="8">
               <a:spcBef>
                 <a:spcPts val="0"/>
               </a:spcBef>
+              <a:buSzPts val="2800"/>
+              <a:buNone/>
               <a:defRPr/>
             </a:lvl9pPr>
           </a:lstStyle>
@@ -1860,7 +1995,7 @@
           </a:bodyPr>
           <a:lstStyle/>
           <a:p>
-            <a:pPr lvl="0">
+            <a:pPr indent="0" lvl="0" marL="0">
               <a:spcBef>
                 <a:spcPts val="0"/>
               </a:spcBef>
@@ -1922,63 +2057,72 @@
               <a:spcBef>
                 <a:spcPts val="0"/>
               </a:spcBef>
-              <a:buSzPct val="100000"/>
+              <a:buSzPts val="2400"/>
+              <a:buNone/>
               <a:defRPr sz="2400"/>
             </a:lvl1pPr>
             <a:lvl2pPr lvl="1">
               <a:spcBef>
                 <a:spcPts val="0"/>
               </a:spcBef>
-              <a:buSzPct val="100000"/>
+              <a:buSzPts val="2400"/>
+              <a:buNone/>
               <a:defRPr sz="2400"/>
             </a:lvl2pPr>
             <a:lvl3pPr lvl="2">
               <a:spcBef>
                 <a:spcPts val="0"/>
               </a:spcBef>
-              <a:buSzPct val="100000"/>
+              <a:buSzPts val="2400"/>
+              <a:buNone/>
               <a:defRPr sz="2400"/>
             </a:lvl3pPr>
             <a:lvl4pPr lvl="3">
               <a:spcBef>
                 <a:spcPts val="0"/>
               </a:spcBef>
-              <a:buSzPct val="100000"/>
+              <a:buSzPts val="2400"/>
+              <a:buNone/>
               <a:defRPr sz="2400"/>
             </a:lvl4pPr>
             <a:lvl5pPr lvl="4">
               <a:spcBef>
                 <a:spcPts val="0"/>
               </a:spcBef>
-              <a:buSzPct val="100000"/>
+              <a:buSzPts val="2400"/>
+              <a:buNone/>
               <a:defRPr sz="2400"/>
             </a:lvl5pPr>
             <a:lvl6pPr lvl="5">
               <a:spcBef>
                 <a:spcPts val="0"/>
               </a:spcBef>
-              <a:buSzPct val="100000"/>
+              <a:buSzPts val="2400"/>
+              <a:buNone/>
               <a:defRPr sz="2400"/>
             </a:lvl6pPr>
             <a:lvl7pPr lvl="6">
               <a:spcBef>
                 <a:spcPts val="0"/>
               </a:spcBef>
-              <a:buSzPct val="100000"/>
+              <a:buSzPts val="2400"/>
+              <a:buNone/>
               <a:defRPr sz="2400"/>
             </a:lvl7pPr>
             <a:lvl8pPr lvl="7">
               <a:spcBef>
                 <a:spcPts val="0"/>
               </a:spcBef>
-              <a:buSzPct val="100000"/>
+              <a:buSzPts val="2400"/>
+              <a:buNone/>
               <a:defRPr sz="2400"/>
             </a:lvl8pPr>
             <a:lvl9pPr lvl="8">
               <a:spcBef>
                 <a:spcPts val="0"/>
               </a:spcBef>
-              <a:buSzPct val="100000"/>
+              <a:buSzPts val="2400"/>
+              <a:buNone/>
               <a:defRPr sz="2400"/>
             </a:lvl9pPr>
           </a:lstStyle>
@@ -2009,63 +2153,72 @@
               <a:spcBef>
                 <a:spcPts val="0"/>
               </a:spcBef>
-              <a:buSzPct val="100000"/>
+              <a:buSzPts val="1200"/>
+              <a:buChar char="●"/>
               <a:defRPr sz="1200"/>
             </a:lvl1pPr>
             <a:lvl2pPr lvl="1">
               <a:spcBef>
                 <a:spcPts val="0"/>
               </a:spcBef>
-              <a:buSzPct val="100000"/>
+              <a:buSzPts val="1200"/>
+              <a:buChar char="○"/>
               <a:defRPr sz="1200"/>
             </a:lvl2pPr>
             <a:lvl3pPr lvl="2">
               <a:spcBef>
                 <a:spcPts val="0"/>
               </a:spcBef>
-              <a:buSzPct val="100000"/>
+              <a:buSzPts val="1200"/>
+              <a:buChar char="■"/>
               <a:defRPr sz="1200"/>
             </a:lvl3pPr>
             <a:lvl4pPr lvl="3">
               <a:spcBef>
                 <a:spcPts val="0"/>
               </a:spcBef>
-              <a:buSzPct val="100000"/>
+              <a:buSzPts val="1200"/>
+              <a:buChar char="●"/>
               <a:defRPr sz="1200"/>
             </a:lvl4pPr>
             <a:lvl5pPr lvl="4">
               <a:spcBef>
                 <a:spcPts val="0"/>
               </a:spcBef>
-              <a:buSzPct val="100000"/>
+              <a:buSzPts val="1200"/>
+              <a:buChar char="○"/>
               <a:defRPr sz="1200"/>
             </a:lvl5pPr>
             <a:lvl6pPr lvl="5">
               <a:spcBef>
                 <a:spcPts val="0"/>
               </a:spcBef>
-              <a:buSzPct val="100000"/>
+              <a:buSzPts val="1200"/>
+              <a:buChar char="■"/>
               <a:defRPr sz="1200"/>
             </a:lvl6pPr>
             <a:lvl7pPr lvl="6">
               <a:spcBef>
                 <a:spcPts val="0"/>
               </a:spcBef>
-              <a:buSzPct val="100000"/>
+              <a:buSzPts val="1200"/>
+              <a:buChar char="●"/>
               <a:defRPr sz="1200"/>
             </a:lvl7pPr>
             <a:lvl8pPr lvl="7">
               <a:spcBef>
                 <a:spcPts val="0"/>
               </a:spcBef>
-              <a:buSzPct val="100000"/>
+              <a:buSzPts val="1200"/>
+              <a:buChar char="○"/>
               <a:defRPr sz="1200"/>
             </a:lvl8pPr>
             <a:lvl9pPr lvl="8">
               <a:spcBef>
                 <a:spcPts val="0"/>
               </a:spcBef>
-              <a:buSzPct val="100000"/>
+              <a:buSzPts val="1200"/>
+              <a:buChar char="■"/>
               <a:defRPr sz="1200"/>
             </a:lvl9pPr>
           </a:lstStyle>
@@ -2095,7 +2248,7 @@
           </a:bodyPr>
           <a:lstStyle/>
           <a:p>
-            <a:pPr lvl="0">
+            <a:pPr indent="0" lvl="0" marL="0">
               <a:spcBef>
                 <a:spcPts val="0"/>
               </a:spcBef>
@@ -2157,63 +2310,72 @@
               <a:spcBef>
                 <a:spcPts val="0"/>
               </a:spcBef>
-              <a:buSzPct val="100000"/>
+              <a:buSzPts val="4800"/>
+              <a:buNone/>
               <a:defRPr sz="4800"/>
             </a:lvl1pPr>
             <a:lvl2pPr lvl="1">
               <a:spcBef>
                 <a:spcPts val="0"/>
               </a:spcBef>
-              <a:buSzPct val="100000"/>
+              <a:buSzPts val="4800"/>
+              <a:buNone/>
               <a:defRPr sz="4800"/>
             </a:lvl2pPr>
             <a:lvl3pPr lvl="2">
               <a:spcBef>
                 <a:spcPts val="0"/>
               </a:spcBef>
-              <a:buSzPct val="100000"/>
+              <a:buSzPts val="4800"/>
+              <a:buNone/>
               <a:defRPr sz="4800"/>
             </a:lvl3pPr>
             <a:lvl4pPr lvl="3">
               <a:spcBef>
                 <a:spcPts val="0"/>
               </a:spcBef>
-              <a:buSzPct val="100000"/>
+              <a:buSzPts val="4800"/>
+              <a:buNone/>
               <a:defRPr sz="4800"/>
             </a:lvl4pPr>
             <a:lvl5pPr lvl="4">
               <a:spcBef>
                 <a:spcPts val="0"/>
               </a:spcBef>
-              <a:buSzPct val="100000"/>
+              <a:buSzPts val="4800"/>
+              <a:buNone/>
               <a:defRPr sz="4800"/>
             </a:lvl5pPr>
             <a:lvl6pPr lvl="5">
               <a:spcBef>
                 <a:spcPts val="0"/>
               </a:spcBef>
-              <a:buSzPct val="100000"/>
+              <a:buSzPts val="4800"/>
+              <a:buNone/>
               <a:defRPr sz="4800"/>
             </a:lvl6pPr>
             <a:lvl7pPr lvl="6">
               <a:spcBef>
                 <a:spcPts val="0"/>
               </a:spcBef>
-              <a:buSzPct val="100000"/>
+              <a:buSzPts val="4800"/>
+              <a:buNone/>
               <a:defRPr sz="4800"/>
             </a:lvl7pPr>
             <a:lvl8pPr lvl="7">
               <a:spcBef>
                 <a:spcPts val="0"/>
               </a:spcBef>
-              <a:buSzPct val="100000"/>
+              <a:buSzPts val="4800"/>
+              <a:buNone/>
               <a:defRPr sz="4800"/>
             </a:lvl8pPr>
             <a:lvl9pPr lvl="8">
               <a:spcBef>
                 <a:spcPts val="0"/>
               </a:spcBef>
-              <a:buSzPct val="100000"/>
+              <a:buSzPts val="4800"/>
+              <a:buNone/>
               <a:defRPr sz="4800"/>
             </a:lvl9pPr>
           </a:lstStyle>
@@ -2243,7 +2405,7 @@
           </a:bodyPr>
           <a:lstStyle/>
           <a:p>
-            <a:pPr lvl="0">
+            <a:pPr indent="0" lvl="0" marL="0">
               <a:spcBef>
                 <a:spcPts val="0"/>
               </a:spcBef>
@@ -2308,7 +2470,7 @@
           </a:bodyPr>
           <a:lstStyle/>
           <a:p>
-            <a:pPr lvl="0">
+            <a:pPr indent="0" lvl="0" marL="0">
               <a:spcBef>
                 <a:spcPts val="0"/>
               </a:spcBef>
@@ -2345,63 +2507,72 @@
               <a:spcBef>
                 <a:spcPts val="0"/>
               </a:spcBef>
-              <a:buSzPct val="100000"/>
+              <a:buSzPts val="4200"/>
+              <a:buNone/>
               <a:defRPr sz="4200"/>
             </a:lvl1pPr>
             <a:lvl2pPr lvl="1" algn="ctr">
               <a:spcBef>
                 <a:spcPts val="0"/>
               </a:spcBef>
-              <a:buSzPct val="100000"/>
+              <a:buSzPts val="4200"/>
+              <a:buNone/>
               <a:defRPr sz="4200"/>
             </a:lvl2pPr>
             <a:lvl3pPr lvl="2" algn="ctr">
               <a:spcBef>
                 <a:spcPts val="0"/>
               </a:spcBef>
-              <a:buSzPct val="100000"/>
+              <a:buSzPts val="4200"/>
+              <a:buNone/>
               <a:defRPr sz="4200"/>
             </a:lvl3pPr>
             <a:lvl4pPr lvl="3" algn="ctr">
               <a:spcBef>
                 <a:spcPts val="0"/>
               </a:spcBef>
-              <a:buSzPct val="100000"/>
+              <a:buSzPts val="4200"/>
+              <a:buNone/>
               <a:defRPr sz="4200"/>
             </a:lvl4pPr>
             <a:lvl5pPr lvl="4" algn="ctr">
               <a:spcBef>
                 <a:spcPts val="0"/>
               </a:spcBef>
-              <a:buSzPct val="100000"/>
+              <a:buSzPts val="4200"/>
+              <a:buNone/>
               <a:defRPr sz="4200"/>
             </a:lvl5pPr>
             <a:lvl6pPr lvl="5" algn="ctr">
               <a:spcBef>
                 <a:spcPts val="0"/>
               </a:spcBef>
-              <a:buSzPct val="100000"/>
+              <a:buSzPts val="4200"/>
+              <a:buNone/>
               <a:defRPr sz="4200"/>
             </a:lvl6pPr>
             <a:lvl7pPr lvl="6" algn="ctr">
               <a:spcBef>
                 <a:spcPts val="0"/>
               </a:spcBef>
-              <a:buSzPct val="100000"/>
+              <a:buSzPts val="4200"/>
+              <a:buNone/>
               <a:defRPr sz="4200"/>
             </a:lvl7pPr>
             <a:lvl8pPr lvl="7" algn="ctr">
               <a:spcBef>
                 <a:spcPts val="0"/>
               </a:spcBef>
-              <a:buSzPct val="100000"/>
+              <a:buSzPts val="4200"/>
+              <a:buNone/>
               <a:defRPr sz="4200"/>
             </a:lvl8pPr>
             <a:lvl9pPr lvl="8" algn="ctr">
               <a:spcBef>
                 <a:spcPts val="0"/>
               </a:spcBef>
-              <a:buSzPct val="100000"/>
+              <a:buSzPts val="4200"/>
+              <a:buNone/>
               <a:defRPr sz="4200"/>
             </a:lvl9pPr>
           </a:lstStyle>
@@ -2438,7 +2609,7 @@
               <a:spcAft>
                 <a:spcPts val="0"/>
               </a:spcAft>
-              <a:buSzPct val="100000"/>
+              <a:buSzPts val="2100"/>
               <a:buNone/>
               <a:defRPr sz="2100"/>
             </a:lvl1pPr>
@@ -2452,7 +2623,7 @@
               <a:spcAft>
                 <a:spcPts val="0"/>
               </a:spcAft>
-              <a:buSzPct val="100000"/>
+              <a:buSzPts val="2100"/>
               <a:buNone/>
               <a:defRPr sz="2100"/>
             </a:lvl2pPr>
@@ -2466,7 +2637,7 @@
               <a:spcAft>
                 <a:spcPts val="0"/>
               </a:spcAft>
-              <a:buSzPct val="100000"/>
+              <a:buSzPts val="2100"/>
               <a:buNone/>
               <a:defRPr sz="2100"/>
             </a:lvl3pPr>
@@ -2480,7 +2651,7 @@
               <a:spcAft>
                 <a:spcPts val="0"/>
               </a:spcAft>
-              <a:buSzPct val="100000"/>
+              <a:buSzPts val="2100"/>
               <a:buNone/>
               <a:defRPr sz="2100"/>
             </a:lvl4pPr>
@@ -2494,7 +2665,7 @@
               <a:spcAft>
                 <a:spcPts val="0"/>
               </a:spcAft>
-              <a:buSzPct val="100000"/>
+              <a:buSzPts val="2100"/>
               <a:buNone/>
               <a:defRPr sz="2100"/>
             </a:lvl5pPr>
@@ -2508,7 +2679,7 @@
               <a:spcAft>
                 <a:spcPts val="0"/>
               </a:spcAft>
-              <a:buSzPct val="100000"/>
+              <a:buSzPts val="2100"/>
               <a:buNone/>
               <a:defRPr sz="2100"/>
             </a:lvl6pPr>
@@ -2522,7 +2693,7 @@
               <a:spcAft>
                 <a:spcPts val="0"/>
               </a:spcAft>
-              <a:buSzPct val="100000"/>
+              <a:buSzPts val="2100"/>
               <a:buNone/>
               <a:defRPr sz="2100"/>
             </a:lvl7pPr>
@@ -2536,7 +2707,7 @@
               <a:spcAft>
                 <a:spcPts val="0"/>
               </a:spcAft>
-              <a:buSzPct val="100000"/>
+              <a:buSzPts val="2100"/>
               <a:buNone/>
               <a:defRPr sz="2100"/>
             </a:lvl8pPr>
@@ -2550,7 +2721,7 @@
               <a:spcAft>
                 <a:spcPts val="0"/>
               </a:spcAft>
-              <a:buSzPct val="100000"/>
+              <a:buSzPts val="2100"/>
               <a:buNone/>
               <a:defRPr sz="2100"/>
             </a:lvl9pPr>
@@ -2582,54 +2753,72 @@
               <a:spcBef>
                 <a:spcPts val="0"/>
               </a:spcBef>
+              <a:buSzPts val="1800"/>
+              <a:buChar char="●"/>
               <a:defRPr/>
             </a:lvl1pPr>
             <a:lvl2pPr lvl="1">
               <a:spcBef>
                 <a:spcPts val="0"/>
               </a:spcBef>
+              <a:buSzPts val="1400"/>
+              <a:buChar char="○"/>
               <a:defRPr/>
             </a:lvl2pPr>
             <a:lvl3pPr lvl="2">
               <a:spcBef>
                 <a:spcPts val="0"/>
               </a:spcBef>
+              <a:buSzPts val="1400"/>
+              <a:buChar char="■"/>
               <a:defRPr/>
             </a:lvl3pPr>
             <a:lvl4pPr lvl="3">
               <a:spcBef>
                 <a:spcPts val="0"/>
               </a:spcBef>
+              <a:buSzPts val="1400"/>
+              <a:buChar char="●"/>
               <a:defRPr/>
             </a:lvl4pPr>
             <a:lvl5pPr lvl="4">
               <a:spcBef>
                 <a:spcPts val="0"/>
               </a:spcBef>
+              <a:buSzPts val="1400"/>
+              <a:buChar char="○"/>
               <a:defRPr/>
             </a:lvl5pPr>
             <a:lvl6pPr lvl="5">
               <a:spcBef>
                 <a:spcPts val="0"/>
               </a:spcBef>
+              <a:buSzPts val="1400"/>
+              <a:buChar char="■"/>
               <a:defRPr/>
             </a:lvl6pPr>
             <a:lvl7pPr lvl="6">
               <a:spcBef>
                 <a:spcPts val="0"/>
               </a:spcBef>
+              <a:buSzPts val="1400"/>
+              <a:buChar char="●"/>
               <a:defRPr/>
             </a:lvl7pPr>
             <a:lvl8pPr lvl="7">
               <a:spcBef>
                 <a:spcPts val="0"/>
               </a:spcBef>
+              <a:buSzPts val="1400"/>
+              <a:buChar char="○"/>
               <a:defRPr/>
             </a:lvl8pPr>
             <a:lvl9pPr lvl="8">
               <a:spcBef>
                 <a:spcPts val="0"/>
               </a:spcBef>
+              <a:buSzPts val="1400"/>
+              <a:buChar char="■"/>
               <a:defRPr/>
             </a:lvl9pPr>
           </a:lstStyle>
@@ -2659,7 +2848,7 @@
           </a:bodyPr>
           <a:lstStyle/>
           <a:p>
-            <a:pPr lvl="0">
+            <a:pPr indent="0" lvl="0" marL="0">
               <a:spcBef>
                 <a:spcPts val="0"/>
               </a:spcBef>
@@ -2727,6 +2916,7 @@
               <a:spcAft>
                 <a:spcPts val="0"/>
               </a:spcAft>
+              <a:buSzPts val="1800"/>
               <a:buNone/>
               <a:defRPr/>
             </a:lvl1pPr>
@@ -2757,7 +2947,7 @@
           </a:bodyPr>
           <a:lstStyle/>
           <a:p>
-            <a:pPr lvl="0">
+            <a:pPr indent="0" lvl="0" marL="0">
               <a:spcBef>
                 <a:spcPts val="0"/>
               </a:spcBef>
@@ -2833,7 +3023,7 @@
               <a:buClr>
                 <a:schemeClr val="dk1"/>
               </a:buClr>
-              <a:buSzPct val="100000"/>
+              <a:buSzPts val="2800"/>
               <a:buNone/>
               <a:defRPr sz="2800">
                 <a:solidFill>
@@ -2848,7 +3038,7 @@
               <a:buClr>
                 <a:schemeClr val="dk1"/>
               </a:buClr>
-              <a:buSzPct val="100000"/>
+              <a:buSzPts val="2800"/>
               <a:buNone/>
               <a:defRPr sz="2800">
                 <a:solidFill>
@@ -2863,7 +3053,7 @@
               <a:buClr>
                 <a:schemeClr val="dk1"/>
               </a:buClr>
-              <a:buSzPct val="100000"/>
+              <a:buSzPts val="2800"/>
               <a:buNone/>
               <a:defRPr sz="2800">
                 <a:solidFill>
@@ -2878,7 +3068,7 @@
               <a:buClr>
                 <a:schemeClr val="dk1"/>
               </a:buClr>
-              <a:buSzPct val="100000"/>
+              <a:buSzPts val="2800"/>
               <a:buNone/>
               <a:defRPr sz="2800">
                 <a:solidFill>
@@ -2893,7 +3083,7 @@
               <a:buClr>
                 <a:schemeClr val="dk1"/>
               </a:buClr>
-              <a:buSzPct val="100000"/>
+              <a:buSzPts val="2800"/>
               <a:buNone/>
               <a:defRPr sz="2800">
                 <a:solidFill>
@@ -2908,7 +3098,7 @@
               <a:buClr>
                 <a:schemeClr val="dk1"/>
               </a:buClr>
-              <a:buSzPct val="100000"/>
+              <a:buSzPts val="2800"/>
               <a:buNone/>
               <a:defRPr sz="2800">
                 <a:solidFill>
@@ -2923,7 +3113,7 @@
               <a:buClr>
                 <a:schemeClr val="dk1"/>
               </a:buClr>
-              <a:buSzPct val="100000"/>
+              <a:buSzPts val="2800"/>
               <a:buNone/>
               <a:defRPr sz="2800">
                 <a:solidFill>
@@ -2938,7 +3128,7 @@
               <a:buClr>
                 <a:schemeClr val="dk1"/>
               </a:buClr>
-              <a:buSzPct val="100000"/>
+              <a:buSzPts val="2800"/>
               <a:buNone/>
               <a:defRPr sz="2800">
                 <a:solidFill>
@@ -2953,7 +3143,7 @@
               <a:buClr>
                 <a:schemeClr val="dk1"/>
               </a:buClr>
-              <a:buSzPct val="100000"/>
+              <a:buSzPts val="2800"/>
               <a:buNone/>
               <a:defRPr sz="2800">
                 <a:solidFill>
@@ -3002,7 +3192,7 @@
               <a:buClr>
                 <a:schemeClr val="dk2"/>
               </a:buClr>
-              <a:buSzPct val="100000"/>
+              <a:buSzPts val="1800"/>
               <a:buChar char="●"/>
               <a:defRPr sz="1800">
                 <a:solidFill>
@@ -3023,6 +3213,7 @@
               <a:buClr>
                 <a:schemeClr val="dk2"/>
               </a:buClr>
+              <a:buSzPts val="1400"/>
               <a:buChar char="○"/>
               <a:defRPr>
                 <a:solidFill>
@@ -3043,6 +3234,7 @@
               <a:buClr>
                 <a:schemeClr val="dk2"/>
               </a:buClr>
+              <a:buSzPts val="1400"/>
               <a:buChar char="■"/>
               <a:defRPr>
                 <a:solidFill>
@@ -3063,6 +3255,7 @@
               <a:buClr>
                 <a:schemeClr val="dk2"/>
               </a:buClr>
+              <a:buSzPts val="1400"/>
               <a:buChar char="●"/>
               <a:defRPr>
                 <a:solidFill>
@@ -3083,6 +3276,7 @@
               <a:buClr>
                 <a:schemeClr val="dk2"/>
               </a:buClr>
+              <a:buSzPts val="1400"/>
               <a:buChar char="○"/>
               <a:defRPr>
                 <a:solidFill>
@@ -3103,6 +3297,7 @@
               <a:buClr>
                 <a:schemeClr val="dk2"/>
               </a:buClr>
+              <a:buSzPts val="1400"/>
               <a:buChar char="■"/>
               <a:defRPr>
                 <a:solidFill>
@@ -3123,6 +3318,7 @@
               <a:buClr>
                 <a:schemeClr val="dk2"/>
               </a:buClr>
+              <a:buSzPts val="1400"/>
               <a:buChar char="●"/>
               <a:defRPr>
                 <a:solidFill>
@@ -3143,6 +3339,7 @@
               <a:buClr>
                 <a:schemeClr val="dk2"/>
               </a:buClr>
+              <a:buSzPts val="1400"/>
               <a:buChar char="○"/>
               <a:defRPr>
                 <a:solidFill>
@@ -3163,6 +3360,7 @@
               <a:buClr>
                 <a:schemeClr val="dk2"/>
               </a:buClr>
+              <a:buSzPts val="1400"/>
               <a:buChar char="■"/>
               <a:defRPr>
                 <a:solidFill>
@@ -3201,7 +3399,7 @@
           </a:bodyPr>
           <a:lstStyle/>
           <a:p>
-            <a:pPr lvl="0" algn="r">
+            <a:pPr indent="0" lvl="0" marL="0" algn="r">
               <a:spcBef>
                 <a:spcPts val="0"/>
               </a:spcBef>
@@ -3703,8 +3901,8 @@
         </p:nvSpPr>
         <p:spPr>
           <a:xfrm>
-            <a:off x="4658783" y="136350"/>
-            <a:ext cx="4181400" cy="4802700"/>
+            <a:off x="2729976" y="300225"/>
+            <a:ext cx="3773700" cy="4413600"/>
           </a:xfrm>
           <a:prstGeom prst="rect">
             <a:avLst/>
@@ -3755,8 +3953,8 @@
         </p:nvSpPr>
         <p:spPr>
           <a:xfrm>
-            <a:off x="439350" y="613575"/>
-            <a:ext cx="2181600" cy="3749700"/>
+            <a:off x="525900" y="1436550"/>
+            <a:ext cx="1316400" cy="2270400"/>
           </a:xfrm>
           <a:prstGeom prst="rect">
             <a:avLst/>
@@ -3780,7 +3978,7 @@
           </a:bodyPr>
           <a:lstStyle/>
           <a:p>
-            <a:pPr lvl="0" algn="ctr">
+            <a:pPr indent="0" lvl="0" marL="0" algn="ctr">
               <a:spcBef>
                 <a:spcPts val="0"/>
               </a:spcBef>
@@ -3809,8 +4007,8 @@
         </p:blipFill>
         <p:spPr>
           <a:xfrm>
-            <a:off x="618225" y="1416525"/>
-            <a:ext cx="1823826" cy="2574626"/>
+            <a:off x="667013" y="2076620"/>
+            <a:ext cx="1034175" cy="1459902"/>
           </a:xfrm>
           <a:prstGeom prst="rect">
             <a:avLst/>
@@ -3828,9 +4026,9 @@
           <p:nvPr/>
         </p:nvCxnSpPr>
         <p:spPr>
-          <a:xfrm>
-            <a:off x="454500" y="1090825"/>
-            <a:ext cx="2174100" cy="0"/>
+          <a:xfrm flipH="1" rot="10800000">
+            <a:off x="541050" y="1907800"/>
+            <a:ext cx="1307400" cy="6000"/>
           </a:xfrm>
           <a:prstGeom prst="straightConnector1">
             <a:avLst/>
@@ -3855,8 +4053,8 @@
         </p:nvCxnSpPr>
         <p:spPr>
           <a:xfrm>
-            <a:off x="4666275" y="613575"/>
-            <a:ext cx="4173900" cy="15300"/>
+            <a:off x="2733353" y="781350"/>
+            <a:ext cx="3766800" cy="14100"/>
           </a:xfrm>
           <a:prstGeom prst="straightConnector1">
             <a:avLst/>
@@ -3881,8 +4079,8 @@
         </p:nvSpPr>
         <p:spPr>
           <a:xfrm>
-            <a:off x="4810250" y="810550"/>
-            <a:ext cx="3772500" cy="886200"/>
+            <a:off x="2914479" y="932486"/>
+            <a:ext cx="3404700" cy="814500"/>
           </a:xfrm>
           <a:prstGeom prst="rect">
             <a:avLst/>
@@ -3904,7 +4102,7 @@
           </a:bodyPr>
           <a:lstStyle/>
           <a:p>
-            <a:pPr lvl="0" algn="ctr">
+            <a:pPr indent="0" lvl="0" marL="0" algn="ctr">
               <a:spcBef>
                 <a:spcPts val="0"/>
               </a:spcBef>
@@ -3916,7 +4114,7 @@
             </a:r>
           </a:p>
           <a:p>
-            <a:pPr lvl="0">
+            <a:pPr indent="0" lvl="0" marL="0">
               <a:spcBef>
                 <a:spcPts val="0"/>
               </a:spcBef>
@@ -3928,7 +4126,7 @@
             <a:endParaRPr/>
           </a:p>
           <a:p>
-            <a:pPr lvl="0">
+            <a:pPr indent="0" lvl="0" marL="0">
               <a:spcBef>
                 <a:spcPts val="0"/>
               </a:spcBef>
@@ -3940,7 +4138,7 @@
             <a:endParaRPr sz="1000"/>
           </a:p>
           <a:p>
-            <a:pPr lvl="0">
+            <a:pPr indent="0" lvl="0" marL="0">
               <a:spcBef>
                 <a:spcPts val="0"/>
               </a:spcBef>
@@ -3952,7 +4150,7 @@
             </a:r>
           </a:p>
           <a:p>
-            <a:pPr lvl="0">
+            <a:pPr indent="0" lvl="0" marL="0">
               <a:spcBef>
                 <a:spcPts val="0"/>
               </a:spcBef>
@@ -3973,8 +4171,8 @@
         </p:nvSpPr>
         <p:spPr>
           <a:xfrm>
-            <a:off x="4840500" y="2825525"/>
-            <a:ext cx="3780000" cy="1931700"/>
+            <a:off x="2941850" y="3536525"/>
+            <a:ext cx="3411300" cy="1134000"/>
           </a:xfrm>
           <a:prstGeom prst="rect">
             <a:avLst/>
@@ -3996,7 +4194,7 @@
           </a:bodyPr>
           <a:lstStyle/>
           <a:p>
-            <a:pPr lvl="0" rtl="0" algn="ctr">
+            <a:pPr indent="0" lvl="0" marL="0" rtl="0" algn="ctr">
               <a:spcBef>
                 <a:spcPts val="0"/>
               </a:spcBef>
@@ -4004,11 +4202,11 @@
             </a:pPr>
             <a:r>
               <a:rPr lang="en"/>
-              <a:t>(soon to come) Options</a:t>
+              <a:t>Test Mode</a:t>
             </a:r>
           </a:p>
           <a:p>
-            <a:pPr lvl="0" rtl="0" algn="ctr">
+            <a:pPr indent="0" lvl="0" marL="0" rtl="0" algn="ctr">
               <a:spcBef>
                 <a:spcPts val="0"/>
               </a:spcBef>
@@ -4020,19 +4218,7 @@
             <a:endParaRPr/>
           </a:p>
           <a:p>
-            <a:pPr lvl="0" rtl="0" algn="ctr">
-              <a:spcBef>
-                <a:spcPts val="0"/>
-              </a:spcBef>
-              <a:buNone/>
-            </a:pPr>
-            <a:r>
-              <a:t/>
-            </a:r>
-            <a:endParaRPr/>
-          </a:p>
-          <a:p>
-            <a:pPr lvl="0" rtl="0">
+            <a:pPr indent="0" lvl="0" marL="0">
               <a:spcBef>
                 <a:spcPts val="0"/>
               </a:spcBef>
@@ -4040,35 +4226,65 @@
             </a:pPr>
             <a:r>
               <a:rPr lang="en" sz="1000"/>
-              <a:t>Change sound options</a:t>
+              <a:t>Test mode allows an easier way for the developer to test specific levels or enemies. There is no specific “test mode” button, but are built in test mode states to help the developer</a:t>
             </a:r>
           </a:p>
+        </p:txBody>
+      </p:sp>
+      <p:sp>
+        <p:nvSpPr>
+          <p:cNvPr id="61" name="Shape 61"/>
+          <p:cNvSpPr txBox="1"/>
+          <p:nvPr/>
+        </p:nvSpPr>
+        <p:spPr>
+          <a:xfrm>
+            <a:off x="2941854" y="1884002"/>
+            <a:ext cx="3377100" cy="661500"/>
+          </a:xfrm>
+          <a:prstGeom prst="rect">
+            <a:avLst/>
+          </a:prstGeom>
+          <a:noFill/>
+          <a:ln cap="flat" cmpd="sng" w="9525">
+            <a:solidFill>
+              <a:srgbClr val="000000"/>
+            </a:solidFill>
+            <a:prstDash val="solid"/>
+            <a:round/>
+            <a:headEnd len="med" w="med" type="none"/>
+            <a:tailEnd len="med" w="med" type="none"/>
+          </a:ln>
+        </p:spPr>
+        <p:txBody>
+          <a:bodyPr anchorCtr="0" anchor="t" bIns="91425" lIns="91425" rIns="91425" wrap="square" tIns="91425">
+            <a:noAutofit/>
+          </a:bodyPr>
+          <a:lstStyle/>
           <a:p>
-            <a:pPr lvl="0">
+            <a:pPr indent="0" lvl="0" marL="0" algn="ctr">
               <a:spcBef>
                 <a:spcPts val="0"/>
               </a:spcBef>
               <a:buNone/>
             </a:pPr>
             <a:r>
-              <a:rPr lang="en" sz="1000"/>
-              <a:t>Change aesthetics options</a:t>
+              <a:rPr lang="en"/>
+              <a:t>Pause Game</a:t>
             </a:r>
           </a:p>
         </p:txBody>
       </p:sp>
       <p:cxnSp>
         <p:nvCxnSpPr>
-          <p:cNvPr id="61" name="Shape 61"/>
-          <p:cNvCxnSpPr>
-            <a:endCxn id="59" idx="1"/>
-          </p:cNvCxnSpPr>
+          <p:cNvPr id="62" name="Shape 62"/>
+          <p:cNvCxnSpPr/>
           <p:nvPr/>
         </p:nvCxnSpPr>
         <p:spPr>
-          <a:xfrm flipH="1" rot="10800000">
-            <a:off x="2158850" y="1253650"/>
-            <a:ext cx="2651400" cy="1109700"/>
+          <a:xfrm>
+            <a:off x="4550094" y="1746975"/>
+            <a:ext cx="43800" cy="165900"/>
           </a:xfrm>
           <a:prstGeom prst="straightConnector1">
             <a:avLst/>
@@ -4085,18 +4301,90 @@
           </a:ln>
         </p:spPr>
       </p:cxnSp>
+      <p:sp>
+        <p:nvSpPr>
+          <p:cNvPr id="63" name="Shape 63"/>
+          <p:cNvSpPr txBox="1"/>
+          <p:nvPr/>
+        </p:nvSpPr>
+        <p:spPr>
+          <a:xfrm>
+            <a:off x="7385200" y="1516150"/>
+            <a:ext cx="1593900" cy="2270400"/>
+          </a:xfrm>
+          <a:prstGeom prst="rect">
+            <a:avLst/>
+          </a:prstGeom>
+          <a:solidFill>
+            <a:srgbClr val="0000FF"/>
+          </a:solidFill>
+          <a:ln cap="flat" cmpd="sng" w="9525">
+            <a:solidFill>
+              <a:srgbClr val="000000"/>
+            </a:solidFill>
+            <a:prstDash val="solid"/>
+            <a:round/>
+            <a:headEnd len="med" w="med" type="none"/>
+            <a:tailEnd len="med" w="med" type="none"/>
+          </a:ln>
+        </p:spPr>
+        <p:txBody>
+          <a:bodyPr anchorCtr="0" anchor="t" bIns="91425" lIns="91425" rIns="91425" wrap="square" tIns="91425">
+            <a:noAutofit/>
+          </a:bodyPr>
+          <a:lstStyle/>
+          <a:p>
+            <a:pPr indent="0" lvl="0" marL="0" rtl="0" algn="ctr">
+              <a:spcBef>
+                <a:spcPts val="0"/>
+              </a:spcBef>
+              <a:buNone/>
+            </a:pPr>
+            <a:r>
+              <a:rPr lang="en" sz="2400"/>
+              <a:t>Developer</a:t>
+            </a:r>
+          </a:p>
+        </p:txBody>
+      </p:sp>
+      <p:pic>
+        <p:nvPicPr>
+          <p:cNvPr descr="1200px-Stick_Figure.svg.png" id="64" name="Shape 64"/>
+          <p:cNvPicPr preferRelativeResize="0"/>
+          <p:nvPr/>
+        </p:nvPicPr>
+        <p:blipFill>
+          <a:blip r:embed="rId3">
+            <a:alphaModFix/>
+          </a:blip>
+          <a:stretch>
+            <a:fillRect/>
+          </a:stretch>
+        </p:blipFill>
+        <p:spPr>
+          <a:xfrm>
+            <a:off x="7654238" y="2137670"/>
+            <a:ext cx="1034175" cy="1459902"/>
+          </a:xfrm>
+          <a:prstGeom prst="rect">
+            <a:avLst/>
+          </a:prstGeom>
+          <a:noFill/>
+          <a:ln>
+            <a:noFill/>
+          </a:ln>
+        </p:spPr>
+      </p:pic>
       <p:cxnSp>
         <p:nvCxnSpPr>
-          <p:cNvPr id="62" name="Shape 62"/>
-          <p:cNvCxnSpPr>
-            <a:endCxn id="60" idx="1"/>
-          </p:cNvCxnSpPr>
+          <p:cNvPr id="65" name="Shape 65"/>
+          <p:cNvCxnSpPr/>
           <p:nvPr/>
         </p:nvCxnSpPr>
         <p:spPr>
           <a:xfrm>
-            <a:off x="2227200" y="3242075"/>
-            <a:ext cx="2613300" cy="549300"/>
+            <a:off x="7412350" y="1987450"/>
+            <a:ext cx="1572900" cy="0"/>
           </a:xfrm>
           <a:prstGeom prst="straightConnector1">
             <a:avLst/>
@@ -4109,67 +4397,23 @@
             <a:prstDash val="solid"/>
             <a:round/>
             <a:headEnd len="lg" w="lg" type="none"/>
-            <a:tailEnd len="lg" w="lg" type="triangle"/>
+            <a:tailEnd len="lg" w="lg" type="none"/>
           </a:ln>
         </p:spPr>
       </p:cxnSp>
-      <p:sp>
-        <p:nvSpPr>
-          <p:cNvPr id="63" name="Shape 63"/>
-          <p:cNvSpPr txBox="1"/>
-          <p:nvPr/>
-        </p:nvSpPr>
-        <p:spPr>
-          <a:xfrm>
-            <a:off x="4840500" y="1893775"/>
-            <a:ext cx="3742200" cy="719700"/>
-          </a:xfrm>
-          <a:prstGeom prst="rect">
-            <a:avLst/>
-          </a:prstGeom>
-          <a:noFill/>
-          <a:ln cap="flat" cmpd="sng" w="9525">
-            <a:solidFill>
-              <a:srgbClr val="000000"/>
-            </a:solidFill>
-            <a:prstDash val="solid"/>
-            <a:round/>
-            <a:headEnd len="med" w="med" type="none"/>
-            <a:tailEnd len="med" w="med" type="none"/>
-          </a:ln>
-        </p:spPr>
-        <p:txBody>
-          <a:bodyPr anchorCtr="0" anchor="t" bIns="91425" lIns="91425" rIns="91425" wrap="square" tIns="91425">
-            <a:noAutofit/>
-          </a:bodyPr>
-          <a:lstStyle/>
-          <a:p>
-            <a:pPr lvl="0" algn="ctr">
-              <a:spcBef>
-                <a:spcPts val="0"/>
-              </a:spcBef>
-              <a:buNone/>
-            </a:pPr>
-            <a:r>
-              <a:rPr lang="en"/>
-              <a:t>Game Ends</a:t>
-            </a:r>
-          </a:p>
-        </p:txBody>
-      </p:sp>
       <p:cxnSp>
         <p:nvCxnSpPr>
-          <p:cNvPr id="64" name="Shape 64"/>
+          <p:cNvPr id="66" name="Shape 66"/>
           <p:cNvCxnSpPr>
-            <a:stCxn id="59" idx="2"/>
-            <a:endCxn id="63" idx="0"/>
+            <a:stCxn id="55" idx="3"/>
+            <a:endCxn id="59" idx="1"/>
           </p:cNvCxnSpPr>
           <p:nvPr/>
         </p:nvCxnSpPr>
         <p:spPr>
-          <a:xfrm>
-            <a:off x="6696500" y="1696750"/>
-            <a:ext cx="15000" cy="197100"/>
+          <a:xfrm flipH="1" rot="10800000">
+            <a:off x="1842300" y="1339650"/>
+            <a:ext cx="1072200" cy="1232100"/>
           </a:xfrm>
           <a:prstGeom prst="straightConnector1">
             <a:avLst/>
@@ -4177,7 +4421,123 @@
           <a:noFill/>
           <a:ln cap="flat" cmpd="sng" w="9525">
             <a:solidFill>
-              <a:srgbClr val="000000"/>
+              <a:schemeClr val="dk2"/>
+            </a:solidFill>
+            <a:prstDash val="solid"/>
+            <a:round/>
+            <a:headEnd len="lg" w="lg" type="none"/>
+            <a:tailEnd len="lg" w="lg" type="triangle"/>
+          </a:ln>
+        </p:spPr>
+      </p:cxnSp>
+      <p:cxnSp>
+        <p:nvCxnSpPr>
+          <p:cNvPr id="67" name="Shape 67"/>
+          <p:cNvCxnSpPr>
+            <a:stCxn id="55" idx="3"/>
+            <a:endCxn id="61" idx="1"/>
+          </p:cNvCxnSpPr>
+          <p:nvPr/>
+        </p:nvCxnSpPr>
+        <p:spPr>
+          <a:xfrm flipH="1" rot="10800000">
+            <a:off x="1842300" y="2214750"/>
+            <a:ext cx="1099500" cy="357000"/>
+          </a:xfrm>
+          <a:prstGeom prst="straightConnector1">
+            <a:avLst/>
+          </a:prstGeom>
+          <a:noFill/>
+          <a:ln cap="flat" cmpd="sng" w="9525">
+            <a:solidFill>
+              <a:schemeClr val="dk2"/>
+            </a:solidFill>
+            <a:prstDash val="solid"/>
+            <a:round/>
+            <a:headEnd len="lg" w="lg" type="none"/>
+            <a:tailEnd len="lg" w="lg" type="triangle"/>
+          </a:ln>
+        </p:spPr>
+      </p:cxnSp>
+      <p:cxnSp>
+        <p:nvCxnSpPr>
+          <p:cNvPr id="68" name="Shape 68"/>
+          <p:cNvCxnSpPr>
+            <a:stCxn id="63" idx="1"/>
+            <a:endCxn id="59" idx="3"/>
+          </p:cNvCxnSpPr>
+          <p:nvPr/>
+        </p:nvCxnSpPr>
+        <p:spPr>
+          <a:xfrm rot="10800000">
+            <a:off x="6319300" y="1339750"/>
+            <a:ext cx="1065900" cy="1311600"/>
+          </a:xfrm>
+          <a:prstGeom prst="straightConnector1">
+            <a:avLst/>
+          </a:prstGeom>
+          <a:noFill/>
+          <a:ln cap="flat" cmpd="sng" w="9525">
+            <a:solidFill>
+              <a:schemeClr val="dk2"/>
+            </a:solidFill>
+            <a:prstDash val="solid"/>
+            <a:round/>
+            <a:headEnd len="lg" w="lg" type="none"/>
+            <a:tailEnd len="lg" w="lg" type="triangle"/>
+          </a:ln>
+        </p:spPr>
+      </p:cxnSp>
+      <p:cxnSp>
+        <p:nvCxnSpPr>
+          <p:cNvPr id="69" name="Shape 69"/>
+          <p:cNvCxnSpPr>
+            <a:stCxn id="63" idx="1"/>
+            <a:endCxn id="61" idx="3"/>
+          </p:cNvCxnSpPr>
+          <p:nvPr/>
+        </p:nvCxnSpPr>
+        <p:spPr>
+          <a:xfrm rot="10800000">
+            <a:off x="6319000" y="2214850"/>
+            <a:ext cx="1066200" cy="436500"/>
+          </a:xfrm>
+          <a:prstGeom prst="straightConnector1">
+            <a:avLst/>
+          </a:prstGeom>
+          <a:noFill/>
+          <a:ln cap="flat" cmpd="sng" w="9525">
+            <a:solidFill>
+              <a:schemeClr val="dk2"/>
+            </a:solidFill>
+            <a:prstDash val="solid"/>
+            <a:round/>
+            <a:headEnd len="lg" w="lg" type="none"/>
+            <a:tailEnd len="lg" w="lg" type="triangle"/>
+          </a:ln>
+        </p:spPr>
+      </p:cxnSp>
+      <p:cxnSp>
+        <p:nvCxnSpPr>
+          <p:cNvPr id="70" name="Shape 70"/>
+          <p:cNvCxnSpPr>
+            <a:stCxn id="63" idx="1"/>
+            <a:endCxn id="60" idx="3"/>
+          </p:cNvCxnSpPr>
+          <p:nvPr/>
+        </p:nvCxnSpPr>
+        <p:spPr>
+          <a:xfrm flipH="1">
+            <a:off x="6353200" y="2651350"/>
+            <a:ext cx="1032000" cy="1452300"/>
+          </a:xfrm>
+          <a:prstGeom prst="straightConnector1">
+            <a:avLst/>
+          </a:prstGeom>
+          <a:noFill/>
+          <a:ln cap="flat" cmpd="sng" w="9525">
+            <a:solidFill>
+              <a:schemeClr val="dk2"/>
             </a:solidFill>
             <a:prstDash val="solid"/>
             <a:round/>

</xml_diff>